<commit_message>
Align hardcoded demo config, cloud model, docs, and PPT
</commit_message>
<xml_diff>
--- a/docs/ppt/aquarium-defense.pptx
+++ b/docs/ppt/aquarium-defense.pptx
@@ -7517,7 +7517,7 @@
                 <a:ea typeface="Arial" pitchFamily="34" charset="-122"/>
                 <a:cs typeface="Arial" pitchFamily="34" charset="-120"/>
               </a:rPr>
-              <a:t>AK/SK 默认不落盘，需显式开启保存</a:t>
+              <a:t>课设演示版固定内置 AK/SK 与 Device Secret</a:t>
             </a:r>
             <a:endParaRPr lang="en-US" sz="1350" dirty="0"/>
           </a:p>
@@ -7541,7 +7541,7 @@
                 <a:ea typeface="Arial" pitchFamily="34" charset="-122"/>
                 <a:cs typeface="Arial" pitchFamily="34" charset="-120"/>
               </a:rPr>
-              <a:t>Device Secret 同样默认不落盘</a:t>
+              <a:t>前端不提供云端参数编辑入口，避免联调误改</a:t>
             </a:r>
             <a:endParaRPr lang="en-US" sz="1350" dirty="0"/>
           </a:p>
@@ -12053,7 +12053,7 @@
         <p:spPr>
           <a:xfrm>
             <a:off x="4873526" y="1552426"/>
-            <a:ext cx="3676799" cy="1981200"/>
+            <a:ext cx="3676799" cy="2247900"/>
           </a:xfrm>
           <a:prstGeom prst="rect">
             <a:avLst/>
@@ -12180,7 +12180,7 @@
                 <a:ea typeface="Arial" pitchFamily="34" charset="-122"/>
                 <a:cs typeface="Arial" pitchFamily="34" charset="-120"/>
               </a:rPr>
-              <a:t>安全性：AK/SK 签名，不硬编码密钥</a:t>
+              <a:t>演示约定：AK/SK 签名 + 固定内置参数（便于快速联调）</a:t>
             </a:r>
             <a:endParaRPr lang="en-US" sz="1400" dirty="0"/>
           </a:p>

</xml_diff>